<commit_message>
Requirements.txt for installing packages
</commit_message>
<xml_diff>
--- a/Final Presentation.pptx
+++ b/Final Presentation.pptx
@@ -118,6 +118,35 @@
     </p:ext>
   </p:extLst>
 </p:presentation>
+</file>
+
+<file path=ppt/changesInfos/changesInfo1.xml><?xml version="1.0" encoding="utf-8"?>
+<pc:chgInfo xmlns:a="http://schemas.openxmlformats.org/drawingml/2006/main" xmlns:r="http://schemas.openxmlformats.org/officeDocument/2006/relationships" xmlns:ac="http://schemas.microsoft.com/office/drawing/2013/main/command" xmlns:pc="http://schemas.microsoft.com/office/powerpoint/2013/main/command">
+  <pc:docChgLst>
+    <pc:chgData name="Euan Ferguson" userId="d3d78bc380f84dea" providerId="LiveId" clId="{61A5FFD5-CED8-4BA7-AF31-850A8E72EF13}"/>
+    <pc:docChg chg="modSld">
+      <pc:chgData name="Euan Ferguson" userId="d3d78bc380f84dea" providerId="LiveId" clId="{61A5FFD5-CED8-4BA7-AF31-850A8E72EF13}" dt="2019-03-21T18:13:59.882" v="42" actId="20577"/>
+      <pc:docMkLst>
+        <pc:docMk/>
+      </pc:docMkLst>
+      <pc:sldChg chg="modSp">
+        <pc:chgData name="Euan Ferguson" userId="d3d78bc380f84dea" providerId="LiveId" clId="{61A5FFD5-CED8-4BA7-AF31-850A8E72EF13}" dt="2019-03-21T18:13:59.882" v="42" actId="20577"/>
+        <pc:sldMkLst>
+          <pc:docMk/>
+          <pc:sldMk cId="2923850440" sldId="279"/>
+        </pc:sldMkLst>
+        <pc:spChg chg="mod">
+          <ac:chgData name="Euan Ferguson" userId="d3d78bc380f84dea" providerId="LiveId" clId="{61A5FFD5-CED8-4BA7-AF31-850A8E72EF13}" dt="2019-03-21T18:13:59.882" v="42" actId="20577"/>
+          <ac:spMkLst>
+            <pc:docMk/>
+            <pc:sldMk cId="2923850440" sldId="279"/>
+            <ac:spMk id="3" creationId="{C46B5B20-B398-4149-889D-A5B4CD6F82E8}"/>
+          </ac:spMkLst>
+        </pc:spChg>
+      </pc:sldChg>
+    </pc:docChg>
+  </pc:docChgLst>
+</pc:chgInfo>
 </file>
 
 <file path=ppt/slideLayouts/slideLayout1.xml><?xml version="1.0" encoding="utf-8"?>
@@ -5699,7 +5728,7 @@
             </a:r>
             <a:r>
               <a:rPr lang="en-US" sz="2400" dirty="0"/>
-              <a:t>Mohammad Majid </a:t>
+              <a:t>Mohammad Majid, James Bradford </a:t>
             </a:r>
           </a:p>
           <a:p>
@@ -5753,11 +5782,11 @@
                   </a:schemeClr>
                 </a:solidFill>
               </a:rPr>
-              <a:t>/Ajax:  </a:t>
+              <a:t>/Ajax/jQuery:  </a:t>
             </a:r>
             <a:r>
               <a:rPr lang="en-US" sz="2400" dirty="0"/>
-              <a:t>James Bradford</a:t>
+              <a:t>James Bradford, Mohammad Majid</a:t>
             </a:r>
           </a:p>
           <a:p>

</xml_diff>